<commit_message>
Documentation fixed for the new tape server
Fixed the read session memory management layout as the file size if not know before hand
(and not really needed, as we read files and consume free blocks in sequence.
Extended the description of the file support classes.
Fixed minor compilation issue.
</commit_message>
<xml_diff>
--- a/castor/tape/tapeserver/documentation/images/RecallMountMM.pptx
+++ b/castor/tape/tapeserver/documentation/images/RecallMountMM.pptx
@@ -288,7 +288,7 @@
           <a:p>
             <a:fld id="{CBA86333-F23A-467F-8B51-1B0299BC507D}" type="datetimeFigureOut">
               <a:rPr lang="en-GB" smtClean="0"/>
-              <a:t>21/11/2013</a:t>
+              <a:t>06/02/2014</a:t>
             </a:fld>
             <a:endParaRPr lang="en-GB"/>
           </a:p>
@@ -458,7 +458,7 @@
           <a:p>
             <a:fld id="{CBA86333-F23A-467F-8B51-1B0299BC507D}" type="datetimeFigureOut">
               <a:rPr lang="en-GB" smtClean="0"/>
-              <a:t>21/11/2013</a:t>
+              <a:t>06/02/2014</a:t>
             </a:fld>
             <a:endParaRPr lang="en-GB"/>
           </a:p>
@@ -638,7 +638,7 @@
           <a:p>
             <a:fld id="{CBA86333-F23A-467F-8B51-1B0299BC507D}" type="datetimeFigureOut">
               <a:rPr lang="en-GB" smtClean="0"/>
-              <a:t>21/11/2013</a:t>
+              <a:t>06/02/2014</a:t>
             </a:fld>
             <a:endParaRPr lang="en-GB"/>
           </a:p>
@@ -808,7 +808,7 @@
           <a:p>
             <a:fld id="{CBA86333-F23A-467F-8B51-1B0299BC507D}" type="datetimeFigureOut">
               <a:rPr lang="en-GB" smtClean="0"/>
-              <a:t>21/11/2013</a:t>
+              <a:t>06/02/2014</a:t>
             </a:fld>
             <a:endParaRPr lang="en-GB"/>
           </a:p>
@@ -1054,7 +1054,7 @@
           <a:p>
             <a:fld id="{CBA86333-F23A-467F-8B51-1B0299BC507D}" type="datetimeFigureOut">
               <a:rPr lang="en-GB" smtClean="0"/>
-              <a:t>21/11/2013</a:t>
+              <a:t>06/02/2014</a:t>
             </a:fld>
             <a:endParaRPr lang="en-GB"/>
           </a:p>
@@ -1342,7 +1342,7 @@
           <a:p>
             <a:fld id="{CBA86333-F23A-467F-8B51-1B0299BC507D}" type="datetimeFigureOut">
               <a:rPr lang="en-GB" smtClean="0"/>
-              <a:t>21/11/2013</a:t>
+              <a:t>06/02/2014</a:t>
             </a:fld>
             <a:endParaRPr lang="en-GB"/>
           </a:p>
@@ -1769,7 +1769,7 @@
           <a:p>
             <a:fld id="{CBA86333-F23A-467F-8B51-1B0299BC507D}" type="datetimeFigureOut">
               <a:rPr lang="en-GB" smtClean="0"/>
-              <a:t>21/11/2013</a:t>
+              <a:t>06/02/2014</a:t>
             </a:fld>
             <a:endParaRPr lang="en-GB"/>
           </a:p>
@@ -1887,7 +1887,7 @@
           <a:p>
             <a:fld id="{CBA86333-F23A-467F-8B51-1B0299BC507D}" type="datetimeFigureOut">
               <a:rPr lang="en-GB" smtClean="0"/>
-              <a:t>21/11/2013</a:t>
+              <a:t>06/02/2014</a:t>
             </a:fld>
             <a:endParaRPr lang="en-GB"/>
           </a:p>
@@ -1982,7 +1982,7 @@
           <a:p>
             <a:fld id="{CBA86333-F23A-467F-8B51-1B0299BC507D}" type="datetimeFigureOut">
               <a:rPr lang="en-GB" smtClean="0"/>
-              <a:t>21/11/2013</a:t>
+              <a:t>06/02/2014</a:t>
             </a:fld>
             <a:endParaRPr lang="en-GB"/>
           </a:p>
@@ -2259,7 +2259,7 @@
           <a:p>
             <a:fld id="{CBA86333-F23A-467F-8B51-1B0299BC507D}" type="datetimeFigureOut">
               <a:rPr lang="en-GB" smtClean="0"/>
-              <a:t>21/11/2013</a:t>
+              <a:t>06/02/2014</a:t>
             </a:fld>
             <a:endParaRPr lang="en-GB"/>
           </a:p>
@@ -2512,7 +2512,7 @@
           <a:p>
             <a:fld id="{CBA86333-F23A-467F-8B51-1B0299BC507D}" type="datetimeFigureOut">
               <a:rPr lang="en-GB" smtClean="0"/>
-              <a:t>21/11/2013</a:t>
+              <a:t>06/02/2014</a:t>
             </a:fld>
             <a:endParaRPr lang="en-GB"/>
           </a:p>
@@ -2725,7 +2725,7 @@
           <a:p>
             <a:fld id="{CBA86333-F23A-467F-8B51-1B0299BC507D}" type="datetimeFigureOut">
               <a:rPr lang="en-GB" smtClean="0"/>
-              <a:t>21/11/2013</a:t>
+              <a:t>06/02/2014</a:t>
             </a:fld>
             <a:endParaRPr lang="en-GB"/>
           </a:p>
@@ -3337,264 +3337,6 @@
       </p:sp>
       <p:grpSp>
         <p:nvGrpSpPr>
-          <p:cNvPr id="63" name="Group 62"/>
-          <p:cNvGrpSpPr/>
-          <p:nvPr/>
-        </p:nvGrpSpPr>
-        <p:grpSpPr>
-          <a:xfrm>
-            <a:off x="3146579" y="1340890"/>
-            <a:ext cx="361436" cy="542219"/>
-            <a:chOff x="5039917" y="2158661"/>
-            <a:chExt cx="361436" cy="542219"/>
-          </a:xfrm>
-        </p:grpSpPr>
-        <p:cxnSp>
-          <p:nvCxnSpPr>
-            <p:cNvPr id="23" name="Straight Connector 22"/>
-            <p:cNvCxnSpPr/>
-            <p:nvPr/>
-          </p:nvCxnSpPr>
-          <p:spPr>
-            <a:xfrm rot="16200000">
-              <a:off x="5221326" y="2516564"/>
-              <a:ext cx="0" cy="360050"/>
-            </a:xfrm>
-            <a:prstGeom prst="line">
-              <a:avLst/>
-            </a:prstGeom>
-          </p:spPr>
-          <p:style>
-            <a:lnRef idx="1">
-              <a:schemeClr val="accent1"/>
-            </a:lnRef>
-            <a:fillRef idx="0">
-              <a:schemeClr val="accent1"/>
-            </a:fillRef>
-            <a:effectRef idx="0">
-              <a:schemeClr val="accent1"/>
-            </a:effectRef>
-            <a:fontRef idx="minor">
-              <a:schemeClr val="tx1"/>
-            </a:fontRef>
-          </p:style>
-        </p:cxnSp>
-        <p:cxnSp>
-          <p:nvCxnSpPr>
-            <p:cNvPr id="37" name="Straight Arrow Connector 36"/>
-            <p:cNvCxnSpPr/>
-            <p:nvPr/>
-          </p:nvCxnSpPr>
-          <p:spPr>
-            <a:xfrm rot="16200000" flipH="1">
-              <a:off x="4978403" y="2458648"/>
-              <a:ext cx="484464" cy="0"/>
-            </a:xfrm>
-            <a:prstGeom prst="straightConnector1">
-              <a:avLst/>
-            </a:prstGeom>
-            <a:ln>
-              <a:tailEnd type="arrow"/>
-            </a:ln>
-          </p:spPr>
-          <p:style>
-            <a:lnRef idx="1">
-              <a:schemeClr val="accent1"/>
-            </a:lnRef>
-            <a:fillRef idx="0">
-              <a:schemeClr val="accent1"/>
-            </a:fillRef>
-            <a:effectRef idx="0">
-              <a:schemeClr val="accent1"/>
-            </a:effectRef>
-            <a:fontRef idx="minor">
-              <a:schemeClr val="tx1"/>
-            </a:fontRef>
-          </p:style>
-        </p:cxnSp>
-        <p:cxnSp>
-          <p:nvCxnSpPr>
-            <p:cNvPr id="53" name="Straight Connector 52"/>
-            <p:cNvCxnSpPr/>
-            <p:nvPr/>
-          </p:nvCxnSpPr>
-          <p:spPr>
-            <a:xfrm flipH="1">
-              <a:off x="5400660" y="2160807"/>
-              <a:ext cx="693" cy="535782"/>
-            </a:xfrm>
-            <a:prstGeom prst="line">
-              <a:avLst/>
-            </a:prstGeom>
-          </p:spPr>
-          <p:style>
-            <a:lnRef idx="1">
-              <a:schemeClr val="accent1"/>
-            </a:lnRef>
-            <a:fillRef idx="0">
-              <a:schemeClr val="accent1"/>
-            </a:fillRef>
-            <a:effectRef idx="0">
-              <a:schemeClr val="accent1"/>
-            </a:effectRef>
-            <a:fontRef idx="minor">
-              <a:schemeClr val="tx1"/>
-            </a:fontRef>
-          </p:style>
-        </p:cxnSp>
-        <p:cxnSp>
-          <p:nvCxnSpPr>
-            <p:cNvPr id="55" name="Straight Connector 54"/>
-            <p:cNvCxnSpPr/>
-            <p:nvPr/>
-          </p:nvCxnSpPr>
-          <p:spPr>
-            <a:xfrm rot="16200000">
-              <a:off x="5220635" y="2428142"/>
-              <a:ext cx="0" cy="360050"/>
-            </a:xfrm>
-            <a:prstGeom prst="line">
-              <a:avLst/>
-            </a:prstGeom>
-          </p:spPr>
-          <p:style>
-            <a:lnRef idx="1">
-              <a:schemeClr val="accent1"/>
-            </a:lnRef>
-            <a:fillRef idx="0">
-              <a:schemeClr val="accent1"/>
-            </a:fillRef>
-            <a:effectRef idx="0">
-              <a:schemeClr val="accent1"/>
-            </a:effectRef>
-            <a:fontRef idx="minor">
-              <a:schemeClr val="tx1"/>
-            </a:fontRef>
-          </p:style>
-        </p:cxnSp>
-        <p:cxnSp>
-          <p:nvCxnSpPr>
-            <p:cNvPr id="56" name="Straight Connector 55"/>
-            <p:cNvCxnSpPr/>
-            <p:nvPr/>
-          </p:nvCxnSpPr>
-          <p:spPr>
-            <a:xfrm rot="16200000">
-              <a:off x="5221326" y="2338132"/>
-              <a:ext cx="0" cy="360050"/>
-            </a:xfrm>
-            <a:prstGeom prst="line">
-              <a:avLst/>
-            </a:prstGeom>
-          </p:spPr>
-          <p:style>
-            <a:lnRef idx="1">
-              <a:schemeClr val="accent1"/>
-            </a:lnRef>
-            <a:fillRef idx="0">
-              <a:schemeClr val="accent1"/>
-            </a:fillRef>
-            <a:effectRef idx="0">
-              <a:schemeClr val="accent1"/>
-            </a:effectRef>
-            <a:fontRef idx="minor">
-              <a:schemeClr val="tx1"/>
-            </a:fontRef>
-          </p:style>
-        </p:cxnSp>
-        <p:cxnSp>
-          <p:nvCxnSpPr>
-            <p:cNvPr id="57" name="Straight Connector 56"/>
-            <p:cNvCxnSpPr/>
-            <p:nvPr/>
-          </p:nvCxnSpPr>
-          <p:spPr>
-            <a:xfrm rot="16200000">
-              <a:off x="5221327" y="2246528"/>
-              <a:ext cx="0" cy="360050"/>
-            </a:xfrm>
-            <a:prstGeom prst="line">
-              <a:avLst/>
-            </a:prstGeom>
-          </p:spPr>
-          <p:style>
-            <a:lnRef idx="1">
-              <a:schemeClr val="accent1"/>
-            </a:lnRef>
-            <a:fillRef idx="0">
-              <a:schemeClr val="accent1"/>
-            </a:fillRef>
-            <a:effectRef idx="0">
-              <a:schemeClr val="accent1"/>
-            </a:effectRef>
-            <a:fontRef idx="minor">
-              <a:schemeClr val="tx1"/>
-            </a:fontRef>
-          </p:style>
-        </p:cxnSp>
-        <p:cxnSp>
-          <p:nvCxnSpPr>
-            <p:cNvPr id="58" name="Straight Connector 57"/>
-            <p:cNvCxnSpPr/>
-            <p:nvPr/>
-          </p:nvCxnSpPr>
-          <p:spPr>
-            <a:xfrm rot="16200000">
-              <a:off x="5220635" y="2158112"/>
-              <a:ext cx="0" cy="360050"/>
-            </a:xfrm>
-            <a:prstGeom prst="line">
-              <a:avLst/>
-            </a:prstGeom>
-          </p:spPr>
-          <p:style>
-            <a:lnRef idx="1">
-              <a:schemeClr val="accent1"/>
-            </a:lnRef>
-            <a:fillRef idx="0">
-              <a:schemeClr val="accent1"/>
-            </a:fillRef>
-            <a:effectRef idx="0">
-              <a:schemeClr val="accent1"/>
-            </a:effectRef>
-            <a:fontRef idx="minor">
-              <a:schemeClr val="tx1"/>
-            </a:fontRef>
-          </p:style>
-        </p:cxnSp>
-        <p:cxnSp>
-          <p:nvCxnSpPr>
-            <p:cNvPr id="62" name="Straight Connector 61"/>
-            <p:cNvCxnSpPr/>
-            <p:nvPr/>
-          </p:nvCxnSpPr>
-          <p:spPr>
-            <a:xfrm flipH="1">
-              <a:off x="5039917" y="2158661"/>
-              <a:ext cx="693" cy="535782"/>
-            </a:xfrm>
-            <a:prstGeom prst="line">
-              <a:avLst/>
-            </a:prstGeom>
-          </p:spPr>
-          <p:style>
-            <a:lnRef idx="1">
-              <a:schemeClr val="accent1"/>
-            </a:lnRef>
-            <a:fillRef idx="0">
-              <a:schemeClr val="accent1"/>
-            </a:fillRef>
-            <a:effectRef idx="0">
-              <a:schemeClr val="accent1"/>
-            </a:effectRef>
-            <a:fontRef idx="minor">
-              <a:schemeClr val="tx1"/>
-            </a:fontRef>
-          </p:style>
-        </p:cxnSp>
-      </p:grpSp>
-      <p:grpSp>
-        <p:nvGrpSpPr>
           <p:cNvPr id="64" name="Group 63"/>
           <p:cNvGrpSpPr/>
           <p:nvPr/>
@@ -3883,36 +3625,6 @@
       </p:sp>
       <p:sp>
         <p:nvSpPr>
-          <p:cNvPr id="74" name="TextBox 73"/>
-          <p:cNvSpPr txBox="1"/>
-          <p:nvPr/>
-        </p:nvSpPr>
-        <p:spPr>
-          <a:xfrm rot="16200000">
-            <a:off x="2681227" y="1496768"/>
-            <a:ext cx="715260" cy="215444"/>
-          </a:xfrm>
-          <a:prstGeom prst="rect">
-            <a:avLst/>
-          </a:prstGeom>
-          <a:noFill/>
-        </p:spPr>
-        <p:txBody>
-          <a:bodyPr wrap="none" rtlCol="0">
-            <a:spAutoFit/>
-          </a:bodyPr>
-          <a:lstStyle/>
-          <a:p>
-            <a:r>
-              <a:rPr lang="en-US" sz="800" dirty="0" smtClean="0"/>
-              <a:t>Client queue</a:t>
-            </a:r>
-            <a:endParaRPr lang="en-GB" sz="800" dirty="0"/>
-          </a:p>
-        </p:txBody>
-      </p:sp>
-      <p:sp>
-        <p:nvSpPr>
           <p:cNvPr id="75" name="TextBox 74"/>
           <p:cNvSpPr txBox="1"/>
           <p:nvPr/>
@@ -4061,264 +3773,6 @@
           </a:p>
         </p:txBody>
       </p:sp>
-      <p:grpSp>
-        <p:nvGrpSpPr>
-          <p:cNvPr id="79" name="Group 78"/>
-          <p:cNvGrpSpPr/>
-          <p:nvPr/>
-        </p:nvGrpSpPr>
-        <p:grpSpPr>
-          <a:xfrm rot="5400000">
-            <a:off x="3598672" y="3213371"/>
-            <a:ext cx="361436" cy="542219"/>
-            <a:chOff x="5039917" y="2158661"/>
-            <a:chExt cx="361436" cy="542219"/>
-          </a:xfrm>
-        </p:grpSpPr>
-        <p:cxnSp>
-          <p:nvCxnSpPr>
-            <p:cNvPr id="80" name="Straight Connector 79"/>
-            <p:cNvCxnSpPr/>
-            <p:nvPr/>
-          </p:nvCxnSpPr>
-          <p:spPr>
-            <a:xfrm rot="16200000">
-              <a:off x="5221326" y="2516564"/>
-              <a:ext cx="0" cy="360050"/>
-            </a:xfrm>
-            <a:prstGeom prst="line">
-              <a:avLst/>
-            </a:prstGeom>
-          </p:spPr>
-          <p:style>
-            <a:lnRef idx="1">
-              <a:schemeClr val="accent1"/>
-            </a:lnRef>
-            <a:fillRef idx="0">
-              <a:schemeClr val="accent1"/>
-            </a:fillRef>
-            <a:effectRef idx="0">
-              <a:schemeClr val="accent1"/>
-            </a:effectRef>
-            <a:fontRef idx="minor">
-              <a:schemeClr val="tx1"/>
-            </a:fontRef>
-          </p:style>
-        </p:cxnSp>
-        <p:cxnSp>
-          <p:nvCxnSpPr>
-            <p:cNvPr id="81" name="Straight Arrow Connector 80"/>
-            <p:cNvCxnSpPr/>
-            <p:nvPr/>
-          </p:nvCxnSpPr>
-          <p:spPr>
-            <a:xfrm rot="16200000" flipH="1">
-              <a:off x="4978403" y="2458648"/>
-              <a:ext cx="484464" cy="0"/>
-            </a:xfrm>
-            <a:prstGeom prst="straightConnector1">
-              <a:avLst/>
-            </a:prstGeom>
-            <a:ln>
-              <a:tailEnd type="arrow"/>
-            </a:ln>
-          </p:spPr>
-          <p:style>
-            <a:lnRef idx="1">
-              <a:schemeClr val="accent1"/>
-            </a:lnRef>
-            <a:fillRef idx="0">
-              <a:schemeClr val="accent1"/>
-            </a:fillRef>
-            <a:effectRef idx="0">
-              <a:schemeClr val="accent1"/>
-            </a:effectRef>
-            <a:fontRef idx="minor">
-              <a:schemeClr val="tx1"/>
-            </a:fontRef>
-          </p:style>
-        </p:cxnSp>
-        <p:cxnSp>
-          <p:nvCxnSpPr>
-            <p:cNvPr id="82" name="Straight Connector 81"/>
-            <p:cNvCxnSpPr/>
-            <p:nvPr/>
-          </p:nvCxnSpPr>
-          <p:spPr>
-            <a:xfrm flipH="1">
-              <a:off x="5400660" y="2160807"/>
-              <a:ext cx="693" cy="535782"/>
-            </a:xfrm>
-            <a:prstGeom prst="line">
-              <a:avLst/>
-            </a:prstGeom>
-          </p:spPr>
-          <p:style>
-            <a:lnRef idx="1">
-              <a:schemeClr val="accent1"/>
-            </a:lnRef>
-            <a:fillRef idx="0">
-              <a:schemeClr val="accent1"/>
-            </a:fillRef>
-            <a:effectRef idx="0">
-              <a:schemeClr val="accent1"/>
-            </a:effectRef>
-            <a:fontRef idx="minor">
-              <a:schemeClr val="tx1"/>
-            </a:fontRef>
-          </p:style>
-        </p:cxnSp>
-        <p:cxnSp>
-          <p:nvCxnSpPr>
-            <p:cNvPr id="83" name="Straight Connector 82"/>
-            <p:cNvCxnSpPr/>
-            <p:nvPr/>
-          </p:nvCxnSpPr>
-          <p:spPr>
-            <a:xfrm rot="16200000">
-              <a:off x="5220635" y="2428142"/>
-              <a:ext cx="0" cy="360050"/>
-            </a:xfrm>
-            <a:prstGeom prst="line">
-              <a:avLst/>
-            </a:prstGeom>
-          </p:spPr>
-          <p:style>
-            <a:lnRef idx="1">
-              <a:schemeClr val="accent1"/>
-            </a:lnRef>
-            <a:fillRef idx="0">
-              <a:schemeClr val="accent1"/>
-            </a:fillRef>
-            <a:effectRef idx="0">
-              <a:schemeClr val="accent1"/>
-            </a:effectRef>
-            <a:fontRef idx="minor">
-              <a:schemeClr val="tx1"/>
-            </a:fontRef>
-          </p:style>
-        </p:cxnSp>
-        <p:cxnSp>
-          <p:nvCxnSpPr>
-            <p:cNvPr id="84" name="Straight Connector 83"/>
-            <p:cNvCxnSpPr/>
-            <p:nvPr/>
-          </p:nvCxnSpPr>
-          <p:spPr>
-            <a:xfrm rot="16200000">
-              <a:off x="5221326" y="2338132"/>
-              <a:ext cx="0" cy="360050"/>
-            </a:xfrm>
-            <a:prstGeom prst="line">
-              <a:avLst/>
-            </a:prstGeom>
-          </p:spPr>
-          <p:style>
-            <a:lnRef idx="1">
-              <a:schemeClr val="accent1"/>
-            </a:lnRef>
-            <a:fillRef idx="0">
-              <a:schemeClr val="accent1"/>
-            </a:fillRef>
-            <a:effectRef idx="0">
-              <a:schemeClr val="accent1"/>
-            </a:effectRef>
-            <a:fontRef idx="minor">
-              <a:schemeClr val="tx1"/>
-            </a:fontRef>
-          </p:style>
-        </p:cxnSp>
-        <p:cxnSp>
-          <p:nvCxnSpPr>
-            <p:cNvPr id="85" name="Straight Connector 84"/>
-            <p:cNvCxnSpPr/>
-            <p:nvPr/>
-          </p:nvCxnSpPr>
-          <p:spPr>
-            <a:xfrm rot="16200000">
-              <a:off x="5221327" y="2246528"/>
-              <a:ext cx="0" cy="360050"/>
-            </a:xfrm>
-            <a:prstGeom prst="line">
-              <a:avLst/>
-            </a:prstGeom>
-          </p:spPr>
-          <p:style>
-            <a:lnRef idx="1">
-              <a:schemeClr val="accent1"/>
-            </a:lnRef>
-            <a:fillRef idx="0">
-              <a:schemeClr val="accent1"/>
-            </a:fillRef>
-            <a:effectRef idx="0">
-              <a:schemeClr val="accent1"/>
-            </a:effectRef>
-            <a:fontRef idx="minor">
-              <a:schemeClr val="tx1"/>
-            </a:fontRef>
-          </p:style>
-        </p:cxnSp>
-        <p:cxnSp>
-          <p:nvCxnSpPr>
-            <p:cNvPr id="86" name="Straight Connector 85"/>
-            <p:cNvCxnSpPr/>
-            <p:nvPr/>
-          </p:nvCxnSpPr>
-          <p:spPr>
-            <a:xfrm rot="16200000">
-              <a:off x="5220635" y="2158112"/>
-              <a:ext cx="0" cy="360050"/>
-            </a:xfrm>
-            <a:prstGeom prst="line">
-              <a:avLst/>
-            </a:prstGeom>
-          </p:spPr>
-          <p:style>
-            <a:lnRef idx="1">
-              <a:schemeClr val="accent1"/>
-            </a:lnRef>
-            <a:fillRef idx="0">
-              <a:schemeClr val="accent1"/>
-            </a:fillRef>
-            <a:effectRef idx="0">
-              <a:schemeClr val="accent1"/>
-            </a:effectRef>
-            <a:fontRef idx="minor">
-              <a:schemeClr val="tx1"/>
-            </a:fontRef>
-          </p:style>
-        </p:cxnSp>
-        <p:cxnSp>
-          <p:nvCxnSpPr>
-            <p:cNvPr id="87" name="Straight Connector 86"/>
-            <p:cNvCxnSpPr/>
-            <p:nvPr/>
-          </p:nvCxnSpPr>
-          <p:spPr>
-            <a:xfrm flipH="1">
-              <a:off x="5039917" y="2158661"/>
-              <a:ext cx="693" cy="535782"/>
-            </a:xfrm>
-            <a:prstGeom prst="line">
-              <a:avLst/>
-            </a:prstGeom>
-          </p:spPr>
-          <p:style>
-            <a:lnRef idx="1">
-              <a:schemeClr val="accent1"/>
-            </a:lnRef>
-            <a:fillRef idx="0">
-              <a:schemeClr val="accent1"/>
-            </a:fillRef>
-            <a:effectRef idx="0">
-              <a:schemeClr val="accent1"/>
-            </a:effectRef>
-            <a:fontRef idx="minor">
-              <a:schemeClr val="tx1"/>
-            </a:fontRef>
-          </p:style>
-        </p:cxnSp>
-      </p:grpSp>
       <p:grpSp>
         <p:nvGrpSpPr>
           <p:cNvPr id="88" name="Group 87"/>
@@ -4579,14 +4033,14 @@
       </p:grpSp>
       <p:sp>
         <p:nvSpPr>
-          <p:cNvPr id="97" name="TextBox 96"/>
+          <p:cNvPr id="116" name="TextBox 115"/>
           <p:cNvSpPr txBox="1"/>
           <p:nvPr/>
         </p:nvSpPr>
         <p:spPr>
           <a:xfrm>
-            <a:off x="3423340" y="3087853"/>
-            <a:ext cx="654346" cy="215444"/>
+            <a:off x="2852664" y="2640116"/>
+            <a:ext cx="846707" cy="215444"/>
           </a:xfrm>
           <a:prstGeom prst="rect">
             <a:avLst/>
@@ -4600,349 +4054,8 @@
           <a:lstStyle/>
           <a:p>
             <a:r>
-              <a:rPr lang="en-US" sz="800" dirty="0" smtClean="0"/>
-              <a:t>Free blocks</a:t>
-            </a:r>
-            <a:endParaRPr lang="en-GB" sz="800" dirty="0"/>
-          </a:p>
-        </p:txBody>
-      </p:sp>
-      <p:sp>
-        <p:nvSpPr>
-          <p:cNvPr id="98" name="Oval 97"/>
-          <p:cNvSpPr/>
-          <p:nvPr/>
-        </p:nvSpPr>
-        <p:spPr>
-          <a:xfrm>
-            <a:off x="3396659" y="1813255"/>
-            <a:ext cx="45719" cy="45719"/>
-          </a:xfrm>
-          <a:prstGeom prst="ellipse">
-            <a:avLst/>
-          </a:prstGeom>
-          <a:solidFill>
-            <a:srgbClr val="4A7EBB"/>
-          </a:solidFill>
-          <a:ln>
-            <a:tailEnd type="arrow"/>
-          </a:ln>
-        </p:spPr>
-        <p:style>
-          <a:lnRef idx="1">
-            <a:schemeClr val="accent1"/>
-          </a:lnRef>
-          <a:fillRef idx="0">
-            <a:schemeClr val="accent1"/>
-          </a:fillRef>
-          <a:effectRef idx="0">
-            <a:schemeClr val="accent1"/>
-          </a:effectRef>
-          <a:fontRef idx="minor">
-            <a:schemeClr val="tx1"/>
-          </a:fontRef>
-        </p:style>
-        <p:txBody>
-          <a:bodyPr rtlCol="0" anchor="ctr"/>
-          <a:lstStyle/>
-          <a:p>
-            <a:pPr algn="ctr"/>
-            <a:endParaRPr lang="en-GB">
-              <a:solidFill>
-                <a:schemeClr val="tx1"/>
-              </a:solidFill>
-            </a:endParaRPr>
-          </a:p>
-        </p:txBody>
-      </p:sp>
-      <p:cxnSp>
-        <p:nvCxnSpPr>
-          <p:cNvPr id="100" name="Curved Connector 99"/>
-          <p:cNvCxnSpPr>
-            <a:stCxn id="98" idx="4"/>
-            <a:endCxn id="77" idx="0"/>
-          </p:cNvCxnSpPr>
-          <p:nvPr/>
-        </p:nvCxnSpPr>
-        <p:spPr>
-          <a:xfrm rot="16200000" flipH="1">
-            <a:off x="3097646" y="2180846"/>
-            <a:ext cx="1005237" cy="361491"/>
-          </a:xfrm>
-          <a:prstGeom prst="curvedConnector3">
-            <a:avLst/>
-          </a:prstGeom>
-          <a:ln>
-            <a:tailEnd type="arrow"/>
-          </a:ln>
-        </p:spPr>
-        <p:style>
-          <a:lnRef idx="1">
-            <a:schemeClr val="accent1"/>
-          </a:lnRef>
-          <a:fillRef idx="0">
-            <a:schemeClr val="accent1"/>
-          </a:fillRef>
-          <a:effectRef idx="0">
-            <a:schemeClr val="accent1"/>
-          </a:effectRef>
-          <a:fontRef idx="minor">
-            <a:schemeClr val="tx1"/>
-          </a:fontRef>
-        </p:style>
-      </p:cxnSp>
-      <p:sp>
-        <p:nvSpPr>
-          <p:cNvPr id="113" name="Freeform 112"/>
-          <p:cNvSpPr/>
-          <p:nvPr/>
-        </p:nvSpPr>
-        <p:spPr>
-          <a:xfrm>
-            <a:off x="3869924" y="1988150"/>
-            <a:ext cx="412516" cy="1506855"/>
-          </a:xfrm>
-          <a:custGeom>
-            <a:avLst/>
-            <a:gdLst>
-              <a:gd name="connsiteX0" fmla="*/ 1036 w 534436"/>
-              <a:gd name="connsiteY0" fmla="*/ 0 h 1364101"/>
-              <a:gd name="connsiteX1" fmla="*/ 54376 w 534436"/>
-              <a:gd name="connsiteY1" fmla="*/ 205740 h 1364101"/>
-              <a:gd name="connsiteX2" fmla="*/ 351556 w 534436"/>
-              <a:gd name="connsiteY2" fmla="*/ 563880 h 1364101"/>
-              <a:gd name="connsiteX3" fmla="*/ 412516 w 534436"/>
-              <a:gd name="connsiteY3" fmla="*/ 1043940 h 1364101"/>
-              <a:gd name="connsiteX4" fmla="*/ 351556 w 534436"/>
-              <a:gd name="connsiteY4" fmla="*/ 1318260 h 1364101"/>
-              <a:gd name="connsiteX5" fmla="*/ 214396 w 534436"/>
-              <a:gd name="connsiteY5" fmla="*/ 1363980 h 1364101"/>
-              <a:gd name="connsiteX6" fmla="*/ 534436 w 534436"/>
-              <a:gd name="connsiteY6" fmla="*/ 1333500 h 1364101"/>
-              <a:gd name="connsiteX0" fmla="*/ 1036 w 2066056"/>
-              <a:gd name="connsiteY0" fmla="*/ 0 h 1397335"/>
-              <a:gd name="connsiteX1" fmla="*/ 54376 w 2066056"/>
-              <a:gd name="connsiteY1" fmla="*/ 205740 h 1397335"/>
-              <a:gd name="connsiteX2" fmla="*/ 351556 w 2066056"/>
-              <a:gd name="connsiteY2" fmla="*/ 563880 h 1397335"/>
-              <a:gd name="connsiteX3" fmla="*/ 412516 w 2066056"/>
-              <a:gd name="connsiteY3" fmla="*/ 1043940 h 1397335"/>
-              <a:gd name="connsiteX4" fmla="*/ 351556 w 2066056"/>
-              <a:gd name="connsiteY4" fmla="*/ 1318260 h 1397335"/>
-              <a:gd name="connsiteX5" fmla="*/ 214396 w 2066056"/>
-              <a:gd name="connsiteY5" fmla="*/ 1363980 h 1397335"/>
-              <a:gd name="connsiteX6" fmla="*/ 2066056 w 2066056"/>
-              <a:gd name="connsiteY6" fmla="*/ 868680 h 1397335"/>
-              <a:gd name="connsiteX0" fmla="*/ 1036 w 412516"/>
-              <a:gd name="connsiteY0" fmla="*/ 0 h 1397335"/>
-              <a:gd name="connsiteX1" fmla="*/ 54376 w 412516"/>
-              <a:gd name="connsiteY1" fmla="*/ 205740 h 1397335"/>
-              <a:gd name="connsiteX2" fmla="*/ 351556 w 412516"/>
-              <a:gd name="connsiteY2" fmla="*/ 563880 h 1397335"/>
-              <a:gd name="connsiteX3" fmla="*/ 412516 w 412516"/>
-              <a:gd name="connsiteY3" fmla="*/ 1043940 h 1397335"/>
-              <a:gd name="connsiteX4" fmla="*/ 351556 w 412516"/>
-              <a:gd name="connsiteY4" fmla="*/ 1318260 h 1397335"/>
-              <a:gd name="connsiteX5" fmla="*/ 214396 w 412516"/>
-              <a:gd name="connsiteY5" fmla="*/ 1363980 h 1397335"/>
-              <a:gd name="connsiteX0" fmla="*/ 1036 w 412516"/>
-              <a:gd name="connsiteY0" fmla="*/ 0 h 1366490"/>
-              <a:gd name="connsiteX1" fmla="*/ 54376 w 412516"/>
-              <a:gd name="connsiteY1" fmla="*/ 205740 h 1366490"/>
-              <a:gd name="connsiteX2" fmla="*/ 351556 w 412516"/>
-              <a:gd name="connsiteY2" fmla="*/ 563880 h 1366490"/>
-              <a:gd name="connsiteX3" fmla="*/ 412516 w 412516"/>
-              <a:gd name="connsiteY3" fmla="*/ 1043940 h 1366490"/>
-              <a:gd name="connsiteX4" fmla="*/ 351556 w 412516"/>
-              <a:gd name="connsiteY4" fmla="*/ 1318260 h 1366490"/>
-              <a:gd name="connsiteX5" fmla="*/ 214396 w 412516"/>
-              <a:gd name="connsiteY5" fmla="*/ 1363980 h 1366490"/>
-              <a:gd name="connsiteX0" fmla="*/ 1036 w 412516"/>
-              <a:gd name="connsiteY0" fmla="*/ 0 h 1363980"/>
-              <a:gd name="connsiteX1" fmla="*/ 54376 w 412516"/>
-              <a:gd name="connsiteY1" fmla="*/ 205740 h 1363980"/>
-              <a:gd name="connsiteX2" fmla="*/ 351556 w 412516"/>
-              <a:gd name="connsiteY2" fmla="*/ 563880 h 1363980"/>
-              <a:gd name="connsiteX3" fmla="*/ 412516 w 412516"/>
-              <a:gd name="connsiteY3" fmla="*/ 1043940 h 1363980"/>
-              <a:gd name="connsiteX4" fmla="*/ 351556 w 412516"/>
-              <a:gd name="connsiteY4" fmla="*/ 1318260 h 1363980"/>
-              <a:gd name="connsiteX5" fmla="*/ 214396 w 412516"/>
-              <a:gd name="connsiteY5" fmla="*/ 1363980 h 1363980"/>
-              <a:gd name="connsiteX0" fmla="*/ 1036 w 412516"/>
-              <a:gd name="connsiteY0" fmla="*/ 0 h 1363980"/>
-              <a:gd name="connsiteX1" fmla="*/ 54376 w 412516"/>
-              <a:gd name="connsiteY1" fmla="*/ 205740 h 1363980"/>
-              <a:gd name="connsiteX2" fmla="*/ 351556 w 412516"/>
-              <a:gd name="connsiteY2" fmla="*/ 563880 h 1363980"/>
-              <a:gd name="connsiteX3" fmla="*/ 412516 w 412516"/>
-              <a:gd name="connsiteY3" fmla="*/ 1043940 h 1363980"/>
-              <a:gd name="connsiteX4" fmla="*/ 351556 w 412516"/>
-              <a:gd name="connsiteY4" fmla="*/ 1318260 h 1363980"/>
-              <a:gd name="connsiteX5" fmla="*/ 214396 w 412516"/>
-              <a:gd name="connsiteY5" fmla="*/ 1363980 h 1363980"/>
-              <a:gd name="connsiteX0" fmla="*/ 1036 w 412516"/>
-              <a:gd name="connsiteY0" fmla="*/ 0 h 1506855"/>
-              <a:gd name="connsiteX1" fmla="*/ 54376 w 412516"/>
-              <a:gd name="connsiteY1" fmla="*/ 348615 h 1506855"/>
-              <a:gd name="connsiteX2" fmla="*/ 351556 w 412516"/>
-              <a:gd name="connsiteY2" fmla="*/ 706755 h 1506855"/>
-              <a:gd name="connsiteX3" fmla="*/ 412516 w 412516"/>
-              <a:gd name="connsiteY3" fmla="*/ 1186815 h 1506855"/>
-              <a:gd name="connsiteX4" fmla="*/ 351556 w 412516"/>
-              <a:gd name="connsiteY4" fmla="*/ 1461135 h 1506855"/>
-              <a:gd name="connsiteX5" fmla="*/ 214396 w 412516"/>
-              <a:gd name="connsiteY5" fmla="*/ 1506855 h 1506855"/>
-            </a:gdLst>
-            <a:ahLst/>
-            <a:cxnLst>
-              <a:cxn ang="0">
-                <a:pos x="connsiteX0" y="connsiteY0"/>
-              </a:cxn>
-              <a:cxn ang="0">
-                <a:pos x="connsiteX1" y="connsiteY1"/>
-              </a:cxn>
-              <a:cxn ang="0">
-                <a:pos x="connsiteX2" y="connsiteY2"/>
-              </a:cxn>
-              <a:cxn ang="0">
-                <a:pos x="connsiteX3" y="connsiteY3"/>
-              </a:cxn>
-              <a:cxn ang="0">
-                <a:pos x="connsiteX4" y="connsiteY4"/>
-              </a:cxn>
-              <a:cxn ang="0">
-                <a:pos x="connsiteX5" y="connsiteY5"/>
-              </a:cxn>
-            </a:cxnLst>
-            <a:rect l="l" t="t" r="r" b="b"/>
-            <a:pathLst>
-              <a:path w="412516" h="1506855">
-                <a:moveTo>
-                  <a:pt x="1036" y="0"/>
-                </a:moveTo>
-                <a:cubicBezTo>
-                  <a:pt x="-1504" y="55880"/>
-                  <a:pt x="-4044" y="230823"/>
-                  <a:pt x="54376" y="348615"/>
-                </a:cubicBezTo>
-                <a:cubicBezTo>
-                  <a:pt x="112796" y="466407"/>
-                  <a:pt x="291866" y="567055"/>
-                  <a:pt x="351556" y="706755"/>
-                </a:cubicBezTo>
-                <a:cubicBezTo>
-                  <a:pt x="411246" y="846455"/>
-                  <a:pt x="412516" y="1061085"/>
-                  <a:pt x="412516" y="1186815"/>
-                </a:cubicBezTo>
-                <a:cubicBezTo>
-                  <a:pt x="412516" y="1312545"/>
-                  <a:pt x="384576" y="1407795"/>
-                  <a:pt x="351556" y="1461135"/>
-                </a:cubicBezTo>
-                <a:cubicBezTo>
-                  <a:pt x="318536" y="1514475"/>
-                  <a:pt x="312821" y="1505585"/>
-                  <a:pt x="214396" y="1506855"/>
-                </a:cubicBezTo>
-              </a:path>
-            </a:pathLst>
-          </a:custGeom>
-          <a:ln>
-            <a:solidFill>
-              <a:srgbClr val="FF0000"/>
-            </a:solidFill>
-            <a:tailEnd type="arrow"/>
-          </a:ln>
-        </p:spPr>
-        <p:style>
-          <a:lnRef idx="1">
-            <a:schemeClr val="accent1"/>
-          </a:lnRef>
-          <a:fillRef idx="0">
-            <a:schemeClr val="accent1"/>
-          </a:fillRef>
-          <a:effectRef idx="0">
-            <a:schemeClr val="accent1"/>
-          </a:effectRef>
-          <a:fontRef idx="minor">
-            <a:schemeClr val="tx1"/>
-          </a:fontRef>
-        </p:style>
-        <p:txBody>
-          <a:bodyPr rtlCol="0" anchor="ctr"/>
-          <a:lstStyle/>
-          <a:p>
-            <a:pPr algn="ctr"/>
-            <a:endParaRPr lang="en-GB"/>
-          </a:p>
-        </p:txBody>
-      </p:sp>
-      <p:sp>
-        <p:nvSpPr>
-          <p:cNvPr id="114" name="TextBox 113"/>
-          <p:cNvSpPr txBox="1"/>
-          <p:nvPr/>
-        </p:nvSpPr>
-        <p:spPr>
-          <a:xfrm rot="3934482">
-            <a:off x="3789038" y="2045504"/>
-            <a:ext cx="503664" cy="338554"/>
-          </a:xfrm>
-          <a:prstGeom prst="rect">
-            <a:avLst/>
-          </a:prstGeom>
-          <a:noFill/>
-        </p:spPr>
-        <p:txBody>
-          <a:bodyPr wrap="none" rtlCol="0">
-            <a:spAutoFit/>
-          </a:bodyPr>
-          <a:lstStyle/>
-          <a:p>
-            <a:r>
-              <a:rPr lang="en-US" sz="800" dirty="0" smtClean="0"/>
-              <a:t>Provide</a:t>
-            </a:r>
-          </a:p>
-          <a:p>
-            <a:r>
-              <a:rPr lang="en-US" sz="800" dirty="0" smtClean="0"/>
-              <a:t>blocks</a:t>
-            </a:r>
-          </a:p>
-        </p:txBody>
-      </p:sp>
-      <p:sp>
-        <p:nvSpPr>
-          <p:cNvPr id="116" name="TextBox 115"/>
-          <p:cNvSpPr txBox="1"/>
-          <p:nvPr/>
-        </p:nvSpPr>
-        <p:spPr>
-          <a:xfrm>
-            <a:off x="2852664" y="2640116"/>
-            <a:ext cx="846707" cy="215444"/>
-          </a:xfrm>
-          <a:prstGeom prst="rect">
-            <a:avLst/>
-          </a:prstGeom>
-          <a:noFill/>
-        </p:spPr>
-        <p:txBody>
-          <a:bodyPr wrap="none" rtlCol="0">
-            <a:spAutoFit/>
-          </a:bodyPr>
-          <a:lstStyle/>
-          <a:p>
-            <a:r>
               <a:rPr lang="en-US" sz="800" b="1" dirty="0" smtClean="0"/>
-              <a:t>Disk Write </a:t>
-            </a:r>
-            <a:r>
-              <a:rPr lang="en-US" sz="800" b="1" dirty="0" smtClean="0"/>
-              <a:t>Task</a:t>
+              <a:t>Disk Write Task</a:t>
             </a:r>
             <a:endParaRPr lang="en-GB" sz="800" b="1" dirty="0"/>
           </a:p>
@@ -5045,225 +4158,9 @@
           <a:p>
             <a:r>
               <a:rPr lang="en-US" sz="800" b="1" dirty="0" smtClean="0"/>
-              <a:t>Tape Read </a:t>
-            </a:r>
-            <a:r>
-              <a:rPr lang="en-US" sz="800" b="1" dirty="0" smtClean="0"/>
-              <a:t>Task</a:t>
+              <a:t>Tape Read Task</a:t>
             </a:r>
             <a:endParaRPr lang="en-GB" sz="800" b="1" dirty="0"/>
-          </a:p>
-        </p:txBody>
-      </p:sp>
-      <p:sp>
-        <p:nvSpPr>
-          <p:cNvPr id="120" name="Freeform 119"/>
-          <p:cNvSpPr/>
-          <p:nvPr/>
-        </p:nvSpPr>
-        <p:spPr>
-          <a:xfrm>
-            <a:off x="2045984" y="3427285"/>
-            <a:ext cx="1322448" cy="465070"/>
-          </a:xfrm>
-          <a:custGeom>
-            <a:avLst/>
-            <a:gdLst>
-              <a:gd name="connsiteX0" fmla="*/ 1306461 w 1306461"/>
-              <a:gd name="connsiteY0" fmla="*/ 21940 h 476701"/>
-              <a:gd name="connsiteX1" fmla="*/ 290461 w 1306461"/>
-              <a:gd name="connsiteY1" fmla="*/ 29755 h 476701"/>
-              <a:gd name="connsiteX2" fmla="*/ 1292 w 1306461"/>
-              <a:gd name="connsiteY2" fmla="*/ 311109 h 476701"/>
-              <a:gd name="connsiteX3" fmla="*/ 368615 w 1306461"/>
-              <a:gd name="connsiteY3" fmla="*/ 459601 h 476701"/>
-              <a:gd name="connsiteX4" fmla="*/ 1251753 w 1306461"/>
-              <a:gd name="connsiteY4" fmla="*/ 467417 h 476701"/>
-              <a:gd name="connsiteX0" fmla="*/ 1305416 w 1305416"/>
-              <a:gd name="connsiteY0" fmla="*/ 21940 h 476701"/>
-              <a:gd name="connsiteX1" fmla="*/ 289416 w 1305416"/>
-              <a:gd name="connsiteY1" fmla="*/ 29755 h 476701"/>
-              <a:gd name="connsiteX2" fmla="*/ 247 w 1305416"/>
-              <a:gd name="connsiteY2" fmla="*/ 311109 h 476701"/>
-              <a:gd name="connsiteX3" fmla="*/ 367570 w 1305416"/>
-              <a:gd name="connsiteY3" fmla="*/ 459601 h 476701"/>
-              <a:gd name="connsiteX4" fmla="*/ 1250708 w 1305416"/>
-              <a:gd name="connsiteY4" fmla="*/ 467417 h 476701"/>
-              <a:gd name="connsiteX0" fmla="*/ 1305416 w 1305416"/>
-              <a:gd name="connsiteY0" fmla="*/ 19346 h 476677"/>
-              <a:gd name="connsiteX1" fmla="*/ 289416 w 1305416"/>
-              <a:gd name="connsiteY1" fmla="*/ 27161 h 476677"/>
-              <a:gd name="connsiteX2" fmla="*/ 247 w 1305416"/>
-              <a:gd name="connsiteY2" fmla="*/ 269438 h 476677"/>
-              <a:gd name="connsiteX3" fmla="*/ 367570 w 1305416"/>
-              <a:gd name="connsiteY3" fmla="*/ 457007 h 476677"/>
-              <a:gd name="connsiteX4" fmla="*/ 1250708 w 1305416"/>
-              <a:gd name="connsiteY4" fmla="*/ 464823 h 476677"/>
-              <a:gd name="connsiteX0" fmla="*/ 1305416 w 1344493"/>
-              <a:gd name="connsiteY0" fmla="*/ 19346 h 468039"/>
-              <a:gd name="connsiteX1" fmla="*/ 289416 w 1344493"/>
-              <a:gd name="connsiteY1" fmla="*/ 27161 h 468039"/>
-              <a:gd name="connsiteX2" fmla="*/ 247 w 1344493"/>
-              <a:gd name="connsiteY2" fmla="*/ 269438 h 468039"/>
-              <a:gd name="connsiteX3" fmla="*/ 367570 w 1344493"/>
-              <a:gd name="connsiteY3" fmla="*/ 457007 h 468039"/>
-              <a:gd name="connsiteX4" fmla="*/ 1344493 w 1344493"/>
-              <a:gd name="connsiteY4" fmla="*/ 441376 h 468039"/>
-              <a:gd name="connsiteX0" fmla="*/ 1306461 w 1345538"/>
-              <a:gd name="connsiteY0" fmla="*/ 19346 h 451670"/>
-              <a:gd name="connsiteX1" fmla="*/ 290461 w 1345538"/>
-              <a:gd name="connsiteY1" fmla="*/ 27161 h 451670"/>
-              <a:gd name="connsiteX2" fmla="*/ 1292 w 1345538"/>
-              <a:gd name="connsiteY2" fmla="*/ 269438 h 451670"/>
-              <a:gd name="connsiteX3" fmla="*/ 368615 w 1345538"/>
-              <a:gd name="connsiteY3" fmla="*/ 433561 h 451670"/>
-              <a:gd name="connsiteX4" fmla="*/ 1345538 w 1345538"/>
-              <a:gd name="connsiteY4" fmla="*/ 441376 h 451670"/>
-              <a:gd name="connsiteX0" fmla="*/ 1306461 w 1345538"/>
-              <a:gd name="connsiteY0" fmla="*/ 19346 h 446344"/>
-              <a:gd name="connsiteX1" fmla="*/ 290461 w 1345538"/>
-              <a:gd name="connsiteY1" fmla="*/ 27161 h 446344"/>
-              <a:gd name="connsiteX2" fmla="*/ 1292 w 1345538"/>
-              <a:gd name="connsiteY2" fmla="*/ 269438 h 446344"/>
-              <a:gd name="connsiteX3" fmla="*/ 368615 w 1345538"/>
-              <a:gd name="connsiteY3" fmla="*/ 433561 h 446344"/>
-              <a:gd name="connsiteX4" fmla="*/ 1345538 w 1345538"/>
-              <a:gd name="connsiteY4" fmla="*/ 441376 h 446344"/>
-              <a:gd name="connsiteX0" fmla="*/ 1306461 w 1345538"/>
-              <a:gd name="connsiteY0" fmla="*/ 19346 h 461352"/>
-              <a:gd name="connsiteX1" fmla="*/ 290461 w 1345538"/>
-              <a:gd name="connsiteY1" fmla="*/ 27161 h 461352"/>
-              <a:gd name="connsiteX2" fmla="*/ 1292 w 1345538"/>
-              <a:gd name="connsiteY2" fmla="*/ 269438 h 461352"/>
-              <a:gd name="connsiteX3" fmla="*/ 368615 w 1345538"/>
-              <a:gd name="connsiteY3" fmla="*/ 457007 h 461352"/>
-              <a:gd name="connsiteX4" fmla="*/ 1345538 w 1345538"/>
-              <a:gd name="connsiteY4" fmla="*/ 441376 h 461352"/>
-              <a:gd name="connsiteX0" fmla="*/ 1306817 w 1345894"/>
-              <a:gd name="connsiteY0" fmla="*/ 7739 h 449745"/>
-              <a:gd name="connsiteX1" fmla="*/ 290817 w 1345894"/>
-              <a:gd name="connsiteY1" fmla="*/ 15554 h 449745"/>
-              <a:gd name="connsiteX2" fmla="*/ 1648 w 1345894"/>
-              <a:gd name="connsiteY2" fmla="*/ 257831 h 449745"/>
-              <a:gd name="connsiteX3" fmla="*/ 368971 w 1345894"/>
-              <a:gd name="connsiteY3" fmla="*/ 445400 h 449745"/>
-              <a:gd name="connsiteX4" fmla="*/ 1345894 w 1345894"/>
-              <a:gd name="connsiteY4" fmla="*/ 429769 h 449745"/>
-              <a:gd name="connsiteX0" fmla="*/ 1306817 w 1306817"/>
-              <a:gd name="connsiteY0" fmla="*/ 7739 h 465070"/>
-              <a:gd name="connsiteX1" fmla="*/ 290817 w 1306817"/>
-              <a:gd name="connsiteY1" fmla="*/ 15554 h 465070"/>
-              <a:gd name="connsiteX2" fmla="*/ 1648 w 1306817"/>
-              <a:gd name="connsiteY2" fmla="*/ 257831 h 465070"/>
-              <a:gd name="connsiteX3" fmla="*/ 368971 w 1306817"/>
-              <a:gd name="connsiteY3" fmla="*/ 445400 h 465070"/>
-              <a:gd name="connsiteX4" fmla="*/ 1306817 w 1306817"/>
-              <a:gd name="connsiteY4" fmla="*/ 453215 h 465070"/>
-              <a:gd name="connsiteX0" fmla="*/ 1306817 w 1306817"/>
-              <a:gd name="connsiteY0" fmla="*/ 7739 h 454569"/>
-              <a:gd name="connsiteX1" fmla="*/ 290817 w 1306817"/>
-              <a:gd name="connsiteY1" fmla="*/ 15554 h 454569"/>
-              <a:gd name="connsiteX2" fmla="*/ 1648 w 1306817"/>
-              <a:gd name="connsiteY2" fmla="*/ 257831 h 454569"/>
-              <a:gd name="connsiteX3" fmla="*/ 368971 w 1306817"/>
-              <a:gd name="connsiteY3" fmla="*/ 445400 h 454569"/>
-              <a:gd name="connsiteX4" fmla="*/ 1299002 w 1306817"/>
-              <a:gd name="connsiteY4" fmla="*/ 421954 h 454569"/>
-              <a:gd name="connsiteX0" fmla="*/ 1306817 w 1306817"/>
-              <a:gd name="connsiteY0" fmla="*/ 7739 h 465070"/>
-              <a:gd name="connsiteX1" fmla="*/ 290817 w 1306817"/>
-              <a:gd name="connsiteY1" fmla="*/ 15554 h 465070"/>
-              <a:gd name="connsiteX2" fmla="*/ 1648 w 1306817"/>
-              <a:gd name="connsiteY2" fmla="*/ 257831 h 465070"/>
-              <a:gd name="connsiteX3" fmla="*/ 368971 w 1306817"/>
-              <a:gd name="connsiteY3" fmla="*/ 445400 h 465070"/>
-              <a:gd name="connsiteX4" fmla="*/ 1283371 w 1306817"/>
-              <a:gd name="connsiteY4" fmla="*/ 453215 h 465070"/>
-              <a:gd name="connsiteX0" fmla="*/ 1306817 w 1322448"/>
-              <a:gd name="connsiteY0" fmla="*/ 7739 h 465070"/>
-              <a:gd name="connsiteX1" fmla="*/ 290817 w 1322448"/>
-              <a:gd name="connsiteY1" fmla="*/ 15554 h 465070"/>
-              <a:gd name="connsiteX2" fmla="*/ 1648 w 1322448"/>
-              <a:gd name="connsiteY2" fmla="*/ 257831 h 465070"/>
-              <a:gd name="connsiteX3" fmla="*/ 368971 w 1322448"/>
-              <a:gd name="connsiteY3" fmla="*/ 445400 h 465070"/>
-              <a:gd name="connsiteX4" fmla="*/ 1322448 w 1322448"/>
-              <a:gd name="connsiteY4" fmla="*/ 453215 h 465070"/>
-            </a:gdLst>
-            <a:ahLst/>
-            <a:cxnLst>
-              <a:cxn ang="0">
-                <a:pos x="connsiteX0" y="connsiteY0"/>
-              </a:cxn>
-              <a:cxn ang="0">
-                <a:pos x="connsiteX1" y="connsiteY1"/>
-              </a:cxn>
-              <a:cxn ang="0">
-                <a:pos x="connsiteX2" y="connsiteY2"/>
-              </a:cxn>
-              <a:cxn ang="0">
-                <a:pos x="connsiteX3" y="connsiteY3"/>
-              </a:cxn>
-              <a:cxn ang="0">
-                <a:pos x="connsiteX4" y="connsiteY4"/>
-              </a:cxn>
-            </a:cxnLst>
-            <a:rect l="l" t="t" r="r" b="b"/>
-            <a:pathLst>
-              <a:path w="1322448" h="465070">
-                <a:moveTo>
-                  <a:pt x="1306817" y="7739"/>
-                </a:moveTo>
-                <a:cubicBezTo>
-                  <a:pt x="907581" y="-12451"/>
-                  <a:pt x="531791" y="12949"/>
-                  <a:pt x="290817" y="15554"/>
-                </a:cubicBezTo>
-                <a:cubicBezTo>
-                  <a:pt x="49843" y="18159"/>
-                  <a:pt x="-11378" y="186190"/>
-                  <a:pt x="1648" y="257831"/>
-                </a:cubicBezTo>
-                <a:cubicBezTo>
-                  <a:pt x="14674" y="329472"/>
-                  <a:pt x="148838" y="412836"/>
-                  <a:pt x="368971" y="445400"/>
-                </a:cubicBezTo>
-                <a:cubicBezTo>
-                  <a:pt x="589104" y="477964"/>
-                  <a:pt x="985084" y="462332"/>
-                  <a:pt x="1322448" y="453215"/>
-                </a:cubicBezTo>
-              </a:path>
-            </a:pathLst>
-          </a:custGeom>
-          <a:ln>
-            <a:solidFill>
-              <a:srgbClr val="FF0000"/>
-            </a:solidFill>
-            <a:tailEnd type="arrow"/>
-          </a:ln>
-        </p:spPr>
-        <p:style>
-          <a:lnRef idx="1">
-            <a:schemeClr val="accent1"/>
-          </a:lnRef>
-          <a:fillRef idx="0">
-            <a:schemeClr val="accent1"/>
-          </a:fillRef>
-          <a:effectRef idx="0">
-            <a:schemeClr val="accent1"/>
-          </a:effectRef>
-          <a:fontRef idx="minor">
-            <a:schemeClr val="tx1"/>
-          </a:fontRef>
-        </p:style>
-        <p:txBody>
-          <a:bodyPr rtlCol="0" anchor="ctr"/>
-          <a:lstStyle/>
-          <a:p>
-            <a:pPr algn="ctr"/>
-            <a:endParaRPr lang="en-GB" dirty="0"/>
           </a:p>
         </p:txBody>
       </p:sp>
@@ -5276,7 +4173,7 @@
         <p:spPr>
           <a:xfrm>
             <a:off x="2075734" y="3134020"/>
-            <a:ext cx="526106" cy="338554"/>
+            <a:ext cx="532518" cy="338554"/>
           </a:xfrm>
           <a:prstGeom prst="rect">
             <a:avLst/>
@@ -5291,8 +4188,9 @@
           <a:p>
             <a:r>
               <a:rPr lang="en-US" sz="800" dirty="0" smtClean="0"/>
-              <a:t>Get free</a:t>
-            </a:r>
+              <a:t>Pull free</a:t>
+            </a:r>
+            <a:endParaRPr lang="en-US" sz="800" dirty="0" smtClean="0"/>
           </a:p>
           <a:p>
             <a:r>
@@ -5332,13 +4230,8 @@
           <a:p>
             <a:r>
               <a:rPr lang="en-US" sz="800" dirty="0" smtClean="0"/>
-              <a:t>from </a:t>
-            </a:r>
-            <a:r>
-              <a:rPr lang="en-US" sz="800" dirty="0" smtClean="0"/>
-              <a:t>tape</a:t>
-            </a:r>
-            <a:endParaRPr lang="en-US" sz="800" dirty="0" smtClean="0"/>
+              <a:t>from tape</a:t>
+            </a:r>
           </a:p>
         </p:txBody>
       </p:sp>
@@ -5675,11 +4568,7 @@
           <a:p>
             <a:r>
               <a:rPr lang="en-US" sz="800" dirty="0" smtClean="0"/>
-              <a:t>to </a:t>
-            </a:r>
-            <a:r>
-              <a:rPr lang="en-US" sz="800" dirty="0" smtClean="0"/>
-              <a:t>disk,</a:t>
+              <a:t>to disk,</a:t>
             </a:r>
           </a:p>
           <a:p>
@@ -5687,7 +4576,6 @@
               <a:rPr lang="en-US" sz="800" dirty="0" smtClean="0"/>
               <a:t>report result</a:t>
             </a:r>
-            <a:endParaRPr lang="en-US" sz="800" dirty="0" smtClean="0"/>
           </a:p>
         </p:txBody>
       </p:sp>
@@ -7235,111 +6123,6 @@
           </p:txBody>
         </p:sp>
       </p:grpSp>
-      <p:grpSp>
-        <p:nvGrpSpPr>
-          <p:cNvPr id="193" name="Group 192"/>
-          <p:cNvGrpSpPr/>
-          <p:nvPr/>
-        </p:nvGrpSpPr>
-        <p:grpSpPr>
-          <a:xfrm>
-            <a:off x="2919545" y="2179436"/>
-            <a:ext cx="180020" cy="180020"/>
-            <a:chOff x="1035165" y="1170180"/>
-            <a:chExt cx="180020" cy="180020"/>
-          </a:xfrm>
-        </p:grpSpPr>
-        <p:sp>
-          <p:nvSpPr>
-            <p:cNvPr id="194" name="Circular Arrow 193"/>
-            <p:cNvSpPr/>
-            <p:nvPr/>
-          </p:nvSpPr>
-          <p:spPr>
-            <a:xfrm>
-              <a:off x="1035165" y="1170180"/>
-              <a:ext cx="180020" cy="180020"/>
-            </a:xfrm>
-            <a:prstGeom prst="circularArrow">
-              <a:avLst/>
-            </a:prstGeom>
-            <a:ln>
-              <a:tailEnd type="arrow"/>
-            </a:ln>
-          </p:spPr>
-          <p:style>
-            <a:lnRef idx="1">
-              <a:schemeClr val="accent1"/>
-            </a:lnRef>
-            <a:fillRef idx="0">
-              <a:schemeClr val="accent1"/>
-            </a:fillRef>
-            <a:effectRef idx="0">
-              <a:schemeClr val="accent1"/>
-            </a:effectRef>
-            <a:fontRef idx="minor">
-              <a:schemeClr val="tx1"/>
-            </a:fontRef>
-          </p:style>
-          <p:txBody>
-            <a:bodyPr rtlCol="0" anchor="ctr"/>
-            <a:lstStyle/>
-            <a:p>
-              <a:pPr algn="ctr"/>
-              <a:endParaRPr lang="en-GB">
-                <a:solidFill>
-                  <a:schemeClr val="tx1"/>
-                </a:solidFill>
-              </a:endParaRPr>
-            </a:p>
-          </p:txBody>
-        </p:sp>
-        <p:sp>
-          <p:nvSpPr>
-            <p:cNvPr id="195" name="Circular Arrow 194"/>
-            <p:cNvSpPr/>
-            <p:nvPr/>
-          </p:nvSpPr>
-          <p:spPr>
-            <a:xfrm rot="10800000">
-              <a:off x="1035165" y="1170180"/>
-              <a:ext cx="180020" cy="180020"/>
-            </a:xfrm>
-            <a:prstGeom prst="circularArrow">
-              <a:avLst/>
-            </a:prstGeom>
-            <a:ln>
-              <a:tailEnd type="arrow"/>
-            </a:ln>
-          </p:spPr>
-          <p:style>
-            <a:lnRef idx="1">
-              <a:schemeClr val="accent1"/>
-            </a:lnRef>
-            <a:fillRef idx="0">
-              <a:schemeClr val="accent1"/>
-            </a:fillRef>
-            <a:effectRef idx="0">
-              <a:schemeClr val="accent1"/>
-            </a:effectRef>
-            <a:fontRef idx="minor">
-              <a:schemeClr val="tx1"/>
-            </a:fontRef>
-          </p:style>
-          <p:txBody>
-            <a:bodyPr rtlCol="0" anchor="ctr"/>
-            <a:lstStyle/>
-            <a:p>
-              <a:pPr algn="ctr"/>
-              <a:endParaRPr lang="en-GB">
-                <a:solidFill>
-                  <a:schemeClr val="tx1"/>
-                </a:solidFill>
-              </a:endParaRPr>
-            </a:p>
-          </p:txBody>
-        </p:sp>
-      </p:grpSp>
       <p:sp>
         <p:nvSpPr>
           <p:cNvPr id="196" name="TextBox 195"/>
@@ -7348,8 +6131,8 @@
         </p:nvSpPr>
         <p:spPr>
           <a:xfrm>
-            <a:off x="2778047" y="1962120"/>
-            <a:ext cx="537327" cy="215444"/>
+            <a:off x="2786988" y="2179653"/>
+            <a:ext cx="655949" cy="215444"/>
           </a:xfrm>
           <a:prstGeom prst="rect">
             <a:avLst/>
@@ -7364,8 +6147,9 @@
           <a:p>
             <a:r>
               <a:rPr lang="en-US" sz="800" dirty="0" smtClean="0"/>
-              <a:t>1 thread</a:t>
-            </a:r>
+              <a:t>(no thread)</a:t>
+            </a:r>
+            <a:endParaRPr lang="en-US" sz="800" dirty="0" smtClean="0"/>
           </a:p>
         </p:txBody>
       </p:sp>
@@ -7519,100 +6303,6 @@
         <p:spPr>
           <a:xfrm>
             <a:off x="5827840" y="3204587"/>
-            <a:ext cx="45719" cy="45719"/>
-          </a:xfrm>
-          <a:prstGeom prst="ellipse">
-            <a:avLst/>
-          </a:prstGeom>
-          <a:solidFill>
-            <a:srgbClr val="92D050"/>
-          </a:solidFill>
-          <a:ln>
-            <a:solidFill>
-              <a:srgbClr val="00B050"/>
-            </a:solidFill>
-            <a:tailEnd type="arrow"/>
-          </a:ln>
-        </p:spPr>
-        <p:style>
-          <a:lnRef idx="1">
-            <a:schemeClr val="accent1"/>
-          </a:lnRef>
-          <a:fillRef idx="0">
-            <a:schemeClr val="accent1"/>
-          </a:fillRef>
-          <a:effectRef idx="0">
-            <a:schemeClr val="accent1"/>
-          </a:effectRef>
-          <a:fontRef idx="minor">
-            <a:schemeClr val="tx1"/>
-          </a:fontRef>
-        </p:style>
-        <p:txBody>
-          <a:bodyPr rtlCol="0" anchor="ctr"/>
-          <a:lstStyle/>
-          <a:p>
-            <a:pPr algn="ctr"/>
-            <a:endParaRPr lang="en-GB"/>
-          </a:p>
-        </p:txBody>
-      </p:sp>
-      <p:sp>
-        <p:nvSpPr>
-          <p:cNvPr id="207" name="Oval 206"/>
-          <p:cNvSpPr/>
-          <p:nvPr/>
-        </p:nvSpPr>
-        <p:spPr>
-          <a:xfrm>
-            <a:off x="3394856" y="1716153"/>
-            <a:ext cx="45719" cy="45719"/>
-          </a:xfrm>
-          <a:prstGeom prst="ellipse">
-            <a:avLst/>
-          </a:prstGeom>
-          <a:solidFill>
-            <a:srgbClr val="FF0000"/>
-          </a:solidFill>
-          <a:ln>
-            <a:solidFill>
-              <a:srgbClr val="C00000"/>
-            </a:solidFill>
-            <a:tailEnd type="arrow"/>
-          </a:ln>
-        </p:spPr>
-        <p:style>
-          <a:lnRef idx="1">
-            <a:schemeClr val="accent1"/>
-          </a:lnRef>
-          <a:fillRef idx="0">
-            <a:schemeClr val="accent1"/>
-          </a:fillRef>
-          <a:effectRef idx="0">
-            <a:schemeClr val="accent1"/>
-          </a:effectRef>
-          <a:fontRef idx="minor">
-            <a:schemeClr val="tx1"/>
-          </a:fontRef>
-        </p:style>
-        <p:txBody>
-          <a:bodyPr rtlCol="0" anchor="ctr"/>
-          <a:lstStyle/>
-          <a:p>
-            <a:pPr algn="ctr"/>
-            <a:endParaRPr lang="en-GB"/>
-          </a:p>
-        </p:txBody>
-      </p:sp>
-      <p:sp>
-        <p:nvSpPr>
-          <p:cNvPr id="208" name="Oval 207"/>
-          <p:cNvSpPr/>
-          <p:nvPr/>
-        </p:nvSpPr>
-        <p:spPr>
-          <a:xfrm>
-            <a:off x="3394856" y="1633339"/>
             <a:ext cx="45719" cy="45719"/>
           </a:xfrm>
           <a:prstGeom prst="ellipse">
@@ -8772,213 +7462,6 @@
       </p:sp>
       <p:sp>
         <p:nvSpPr>
-          <p:cNvPr id="240" name="Freeform 239"/>
-          <p:cNvSpPr/>
-          <p:nvPr/>
-        </p:nvSpPr>
-        <p:spPr>
-          <a:xfrm>
-            <a:off x="3351541" y="270080"/>
-            <a:ext cx="2744460" cy="2174707"/>
-          </a:xfrm>
-          <a:custGeom>
-            <a:avLst/>
-            <a:gdLst>
-              <a:gd name="connsiteX0" fmla="*/ 2885855 w 2885855"/>
-              <a:gd name="connsiteY0" fmla="*/ 1917431 h 2424944"/>
-              <a:gd name="connsiteX1" fmla="*/ 2634395 w 2885855"/>
-              <a:gd name="connsiteY1" fmla="*/ 2245091 h 2424944"/>
-              <a:gd name="connsiteX2" fmla="*/ 2085755 w 2885855"/>
-              <a:gd name="connsiteY2" fmla="*/ 2306051 h 2424944"/>
-              <a:gd name="connsiteX3" fmla="*/ 2032415 w 2885855"/>
-              <a:gd name="connsiteY3" fmla="*/ 622031 h 2424944"/>
-              <a:gd name="connsiteX4" fmla="*/ 1377095 w 2885855"/>
-              <a:gd name="connsiteY4" fmla="*/ 4811 h 2424944"/>
-              <a:gd name="connsiteX5" fmla="*/ 112175 w 2885855"/>
-              <a:gd name="connsiteY5" fmla="*/ 378191 h 2424944"/>
-              <a:gd name="connsiteX6" fmla="*/ 142655 w 2885855"/>
-              <a:gd name="connsiteY6" fmla="*/ 1140191 h 2424944"/>
-              <a:gd name="connsiteX0" fmla="*/ 2860081 w 2860081"/>
-              <a:gd name="connsiteY0" fmla="*/ 1917431 h 2424944"/>
-              <a:gd name="connsiteX1" fmla="*/ 2608621 w 2860081"/>
-              <a:gd name="connsiteY1" fmla="*/ 2245091 h 2424944"/>
-              <a:gd name="connsiteX2" fmla="*/ 2059981 w 2860081"/>
-              <a:gd name="connsiteY2" fmla="*/ 2306051 h 2424944"/>
-              <a:gd name="connsiteX3" fmla="*/ 2006641 w 2860081"/>
-              <a:gd name="connsiteY3" fmla="*/ 622031 h 2424944"/>
-              <a:gd name="connsiteX4" fmla="*/ 1351321 w 2860081"/>
-              <a:gd name="connsiteY4" fmla="*/ 4811 h 2424944"/>
-              <a:gd name="connsiteX5" fmla="*/ 86401 w 2860081"/>
-              <a:gd name="connsiteY5" fmla="*/ 378191 h 2424944"/>
-              <a:gd name="connsiteX6" fmla="*/ 116881 w 2860081"/>
-              <a:gd name="connsiteY6" fmla="*/ 1140191 h 2424944"/>
-              <a:gd name="connsiteX0" fmla="*/ 2744460 w 2744460"/>
-              <a:gd name="connsiteY0" fmla="*/ 1917842 h 2425355"/>
-              <a:gd name="connsiteX1" fmla="*/ 2493000 w 2744460"/>
-              <a:gd name="connsiteY1" fmla="*/ 2245502 h 2425355"/>
-              <a:gd name="connsiteX2" fmla="*/ 1944360 w 2744460"/>
-              <a:gd name="connsiteY2" fmla="*/ 2306462 h 2425355"/>
-              <a:gd name="connsiteX3" fmla="*/ 1891020 w 2744460"/>
-              <a:gd name="connsiteY3" fmla="*/ 622442 h 2425355"/>
-              <a:gd name="connsiteX4" fmla="*/ 1235700 w 2744460"/>
-              <a:gd name="connsiteY4" fmla="*/ 5222 h 2425355"/>
-              <a:gd name="connsiteX5" fmla="*/ 260340 w 2744460"/>
-              <a:gd name="connsiteY5" fmla="*/ 370982 h 2425355"/>
-              <a:gd name="connsiteX6" fmla="*/ 1260 w 2744460"/>
-              <a:gd name="connsiteY6" fmla="*/ 1140602 h 2425355"/>
-              <a:gd name="connsiteX0" fmla="*/ 2744899 w 2744899"/>
-              <a:gd name="connsiteY0" fmla="*/ 1916862 h 2424375"/>
-              <a:gd name="connsiteX1" fmla="*/ 2493439 w 2744899"/>
-              <a:gd name="connsiteY1" fmla="*/ 2244522 h 2424375"/>
-              <a:gd name="connsiteX2" fmla="*/ 1944799 w 2744899"/>
-              <a:gd name="connsiteY2" fmla="*/ 2305482 h 2424375"/>
-              <a:gd name="connsiteX3" fmla="*/ 1891459 w 2744899"/>
-              <a:gd name="connsiteY3" fmla="*/ 621462 h 2424375"/>
-              <a:gd name="connsiteX4" fmla="*/ 1236139 w 2744899"/>
-              <a:gd name="connsiteY4" fmla="*/ 4242 h 2424375"/>
-              <a:gd name="connsiteX5" fmla="*/ 260779 w 2744899"/>
-              <a:gd name="connsiteY5" fmla="*/ 370002 h 2424375"/>
-              <a:gd name="connsiteX6" fmla="*/ 1699 w 2744899"/>
-              <a:gd name="connsiteY6" fmla="*/ 1139622 h 2424375"/>
-              <a:gd name="connsiteX0" fmla="*/ 2744460 w 2744460"/>
-              <a:gd name="connsiteY0" fmla="*/ 1784745 h 2292258"/>
-              <a:gd name="connsiteX1" fmla="*/ 2493000 w 2744460"/>
-              <a:gd name="connsiteY1" fmla="*/ 2112405 h 2292258"/>
-              <a:gd name="connsiteX2" fmla="*/ 1944360 w 2744460"/>
-              <a:gd name="connsiteY2" fmla="*/ 2173365 h 2292258"/>
-              <a:gd name="connsiteX3" fmla="*/ 1891020 w 2744460"/>
-              <a:gd name="connsiteY3" fmla="*/ 489345 h 2292258"/>
-              <a:gd name="connsiteX4" fmla="*/ 1235700 w 2744460"/>
-              <a:gd name="connsiteY4" fmla="*/ 9285 h 2292258"/>
-              <a:gd name="connsiteX5" fmla="*/ 260340 w 2744460"/>
-              <a:gd name="connsiteY5" fmla="*/ 237885 h 2292258"/>
-              <a:gd name="connsiteX6" fmla="*/ 1260 w 2744460"/>
-              <a:gd name="connsiteY6" fmla="*/ 1007505 h 2292258"/>
-              <a:gd name="connsiteX0" fmla="*/ 2744460 w 2744460"/>
-              <a:gd name="connsiteY0" fmla="*/ 1784745 h 2292258"/>
-              <a:gd name="connsiteX1" fmla="*/ 2493000 w 2744460"/>
-              <a:gd name="connsiteY1" fmla="*/ 2112405 h 2292258"/>
-              <a:gd name="connsiteX2" fmla="*/ 1944360 w 2744460"/>
-              <a:gd name="connsiteY2" fmla="*/ 2173365 h 2292258"/>
-              <a:gd name="connsiteX3" fmla="*/ 1891020 w 2744460"/>
-              <a:gd name="connsiteY3" fmla="*/ 489345 h 2292258"/>
-              <a:gd name="connsiteX4" fmla="*/ 1235700 w 2744460"/>
-              <a:gd name="connsiteY4" fmla="*/ 9285 h 2292258"/>
-              <a:gd name="connsiteX5" fmla="*/ 260340 w 2744460"/>
-              <a:gd name="connsiteY5" fmla="*/ 237885 h 2292258"/>
-              <a:gd name="connsiteX6" fmla="*/ 1260 w 2744460"/>
-              <a:gd name="connsiteY6" fmla="*/ 1007505 h 2292258"/>
-              <a:gd name="connsiteX0" fmla="*/ 2744460 w 2744460"/>
-              <a:gd name="connsiteY0" fmla="*/ 1784745 h 2174707"/>
-              <a:gd name="connsiteX1" fmla="*/ 2493000 w 2744460"/>
-              <a:gd name="connsiteY1" fmla="*/ 2112405 h 2174707"/>
-              <a:gd name="connsiteX2" fmla="*/ 1944360 w 2744460"/>
-              <a:gd name="connsiteY2" fmla="*/ 2173365 h 2174707"/>
-              <a:gd name="connsiteX3" fmla="*/ 1891020 w 2744460"/>
-              <a:gd name="connsiteY3" fmla="*/ 489345 h 2174707"/>
-              <a:gd name="connsiteX4" fmla="*/ 1235700 w 2744460"/>
-              <a:gd name="connsiteY4" fmla="*/ 9285 h 2174707"/>
-              <a:gd name="connsiteX5" fmla="*/ 260340 w 2744460"/>
-              <a:gd name="connsiteY5" fmla="*/ 237885 h 2174707"/>
-              <a:gd name="connsiteX6" fmla="*/ 1260 w 2744460"/>
-              <a:gd name="connsiteY6" fmla="*/ 1007505 h 2174707"/>
-            </a:gdLst>
-            <a:ahLst/>
-            <a:cxnLst>
-              <a:cxn ang="0">
-                <a:pos x="connsiteX0" y="connsiteY0"/>
-              </a:cxn>
-              <a:cxn ang="0">
-                <a:pos x="connsiteX1" y="connsiteY1"/>
-              </a:cxn>
-              <a:cxn ang="0">
-                <a:pos x="connsiteX2" y="connsiteY2"/>
-              </a:cxn>
-              <a:cxn ang="0">
-                <a:pos x="connsiteX3" y="connsiteY3"/>
-              </a:cxn>
-              <a:cxn ang="0">
-                <a:pos x="connsiteX4" y="connsiteY4"/>
-              </a:cxn>
-              <a:cxn ang="0">
-                <a:pos x="connsiteX5" y="connsiteY5"/>
-              </a:cxn>
-              <a:cxn ang="0">
-                <a:pos x="connsiteX6" y="connsiteY6"/>
-              </a:cxn>
-            </a:cxnLst>
-            <a:rect l="l" t="t" r="r" b="b"/>
-            <a:pathLst>
-              <a:path w="2744460" h="2174707">
-                <a:moveTo>
-                  <a:pt x="2744460" y="1784745"/>
-                </a:moveTo>
-                <a:cubicBezTo>
-                  <a:pt x="2685405" y="1916190"/>
-                  <a:pt x="2626350" y="2047635"/>
-                  <a:pt x="2493000" y="2112405"/>
-                </a:cubicBezTo>
-                <a:cubicBezTo>
-                  <a:pt x="2359650" y="2177175"/>
-                  <a:pt x="2181850" y="2177175"/>
-                  <a:pt x="1944360" y="2173365"/>
-                </a:cubicBezTo>
-                <a:cubicBezTo>
-                  <a:pt x="1706870" y="2169555"/>
-                  <a:pt x="2009130" y="850025"/>
-                  <a:pt x="1891020" y="489345"/>
-                </a:cubicBezTo>
-                <a:cubicBezTo>
-                  <a:pt x="1772910" y="128665"/>
-                  <a:pt x="1499860" y="51195"/>
-                  <a:pt x="1235700" y="9285"/>
-                </a:cubicBezTo>
-                <a:cubicBezTo>
-                  <a:pt x="971540" y="-32625"/>
-                  <a:pt x="466080" y="71515"/>
-                  <a:pt x="260340" y="237885"/>
-                </a:cubicBezTo>
-                <a:cubicBezTo>
-                  <a:pt x="54600" y="404255"/>
-                  <a:pt x="-10170" y="667780"/>
-                  <a:pt x="1260" y="1007505"/>
-                </a:cubicBezTo>
-              </a:path>
-            </a:pathLst>
-          </a:custGeom>
-          <a:ln>
-            <a:tailEnd type="arrow"/>
-          </a:ln>
-        </p:spPr>
-        <p:style>
-          <a:lnRef idx="1">
-            <a:schemeClr val="accent1"/>
-          </a:lnRef>
-          <a:fillRef idx="0">
-            <a:schemeClr val="accent1"/>
-          </a:fillRef>
-          <a:effectRef idx="0">
-            <a:schemeClr val="accent1"/>
-          </a:effectRef>
-          <a:fontRef idx="minor">
-            <a:schemeClr val="tx1"/>
-          </a:fontRef>
-        </p:style>
-        <p:txBody>
-          <a:bodyPr rtlCol="0" anchor="ctr"/>
-          <a:lstStyle/>
-          <a:p>
-            <a:pPr algn="ctr"/>
-            <a:endParaRPr lang="en-GB">
-              <a:solidFill>
-                <a:schemeClr val="tx1"/>
-              </a:solidFill>
-            </a:endParaRPr>
-          </a:p>
-        </p:txBody>
-      </p:sp>
-      <p:sp>
-        <p:nvSpPr>
           <p:cNvPr id="241" name="TextBox 240"/>
           <p:cNvSpPr txBox="1"/>
           <p:nvPr/>
@@ -9342,11 +7825,7 @@
           <a:p>
             <a:r>
               <a:rPr lang="en-US" sz="800" dirty="0" smtClean="0"/>
-              <a:t>Individual file </a:t>
-            </a:r>
-            <a:r>
-              <a:rPr lang="en-US" sz="800" dirty="0" smtClean="0"/>
-              <a:t>reports, flush reports, end of session report</a:t>
+              <a:t>Individual file reports, flush reports, end of session report</a:t>
             </a:r>
             <a:endParaRPr lang="en-GB" sz="800" dirty="0"/>
           </a:p>
@@ -9581,11 +8060,7 @@
           <a:p>
             <a:r>
               <a:rPr lang="en-US" sz="800" dirty="0" smtClean="0"/>
-              <a:t>Pack information</a:t>
-            </a:r>
-            <a:r>
-              <a:rPr lang="en-US" sz="800" dirty="0" smtClean="0"/>
-              <a:t> </a:t>
+              <a:t>Pack information </a:t>
             </a:r>
           </a:p>
           <a:p>
@@ -9599,7 +8074,6 @@
               <a:rPr lang="en-US" sz="800" dirty="0" smtClean="0"/>
               <a:t>threshold/end session</a:t>
             </a:r>
-            <a:endParaRPr lang="en-US" sz="800" dirty="0" smtClean="0"/>
           </a:p>
         </p:txBody>
       </p:sp>
@@ -9933,7 +8407,6 @@
               <a:rPr lang="en-US" sz="800" dirty="0" smtClean="0"/>
               <a:t>Wait for completion </a:t>
             </a:r>
-            <a:endParaRPr lang="en-US" sz="800" dirty="0" smtClean="0"/>
           </a:p>
         </p:txBody>
       </p:sp>
@@ -10394,6 +8867,152 @@
           <a:p>
             <a:pPr algn="ctr"/>
             <a:endParaRPr lang="en-GB"/>
+          </a:p>
+        </p:txBody>
+      </p:sp>
+      <p:sp>
+        <p:nvSpPr>
+          <p:cNvPr id="6" name="Freeform 5"/>
+          <p:cNvSpPr/>
+          <p:nvPr/>
+        </p:nvSpPr>
+        <p:spPr>
+          <a:xfrm>
+            <a:off x="2025108" y="1889760"/>
+            <a:ext cx="1851778" cy="2029231"/>
+          </a:xfrm>
+          <a:custGeom>
+            <a:avLst/>
+            <a:gdLst>
+              <a:gd name="connsiteX0" fmla="*/ 1838232 w 1851778"/>
+              <a:gd name="connsiteY0" fmla="*/ 0 h 2029231"/>
+              <a:gd name="connsiteX1" fmla="*/ 1845852 w 1851778"/>
+              <a:gd name="connsiteY1" fmla="*/ 144780 h 2029231"/>
+              <a:gd name="connsiteX2" fmla="*/ 1762032 w 1851778"/>
+              <a:gd name="connsiteY2" fmla="*/ 251460 h 2029231"/>
+              <a:gd name="connsiteX3" fmla="*/ 1502952 w 1851778"/>
+              <a:gd name="connsiteY3" fmla="*/ 274320 h 2029231"/>
+              <a:gd name="connsiteX4" fmla="*/ 497112 w 1851778"/>
+              <a:gd name="connsiteY4" fmla="*/ 281940 h 2029231"/>
+              <a:gd name="connsiteX5" fmla="*/ 116112 w 1851778"/>
+              <a:gd name="connsiteY5" fmla="*/ 1333500 h 2029231"/>
+              <a:gd name="connsiteX6" fmla="*/ 1812 w 1851778"/>
+              <a:gd name="connsiteY6" fmla="*/ 1783080 h 2029231"/>
+              <a:gd name="connsiteX7" fmla="*/ 184692 w 1851778"/>
+              <a:gd name="connsiteY7" fmla="*/ 2011680 h 2029231"/>
+              <a:gd name="connsiteX8" fmla="*/ 1441992 w 1851778"/>
+              <a:gd name="connsiteY8" fmla="*/ 1996440 h 2029231"/>
+            </a:gdLst>
+            <a:ahLst/>
+            <a:cxnLst>
+              <a:cxn ang="0">
+                <a:pos x="connsiteX0" y="connsiteY0"/>
+              </a:cxn>
+              <a:cxn ang="0">
+                <a:pos x="connsiteX1" y="connsiteY1"/>
+              </a:cxn>
+              <a:cxn ang="0">
+                <a:pos x="connsiteX2" y="connsiteY2"/>
+              </a:cxn>
+              <a:cxn ang="0">
+                <a:pos x="connsiteX3" y="connsiteY3"/>
+              </a:cxn>
+              <a:cxn ang="0">
+                <a:pos x="connsiteX4" y="connsiteY4"/>
+              </a:cxn>
+              <a:cxn ang="0">
+                <a:pos x="connsiteX5" y="connsiteY5"/>
+              </a:cxn>
+              <a:cxn ang="0">
+                <a:pos x="connsiteX6" y="connsiteY6"/>
+              </a:cxn>
+              <a:cxn ang="0">
+                <a:pos x="connsiteX7" y="connsiteY7"/>
+              </a:cxn>
+              <a:cxn ang="0">
+                <a:pos x="connsiteX8" y="connsiteY8"/>
+              </a:cxn>
+            </a:cxnLst>
+            <a:rect l="l" t="t" r="r" b="b"/>
+            <a:pathLst>
+              <a:path w="1851778" h="2029231">
+                <a:moveTo>
+                  <a:pt x="1838232" y="0"/>
+                </a:moveTo>
+                <a:cubicBezTo>
+                  <a:pt x="1848392" y="51435"/>
+                  <a:pt x="1858552" y="102870"/>
+                  <a:pt x="1845852" y="144780"/>
+                </a:cubicBezTo>
+                <a:cubicBezTo>
+                  <a:pt x="1833152" y="186690"/>
+                  <a:pt x="1819182" y="229870"/>
+                  <a:pt x="1762032" y="251460"/>
+                </a:cubicBezTo>
+                <a:cubicBezTo>
+                  <a:pt x="1704882" y="273050"/>
+                  <a:pt x="1713772" y="269240"/>
+                  <a:pt x="1502952" y="274320"/>
+                </a:cubicBezTo>
+                <a:cubicBezTo>
+                  <a:pt x="1292132" y="279400"/>
+                  <a:pt x="728252" y="105410"/>
+                  <a:pt x="497112" y="281940"/>
+                </a:cubicBezTo>
+                <a:cubicBezTo>
+                  <a:pt x="265972" y="458470"/>
+                  <a:pt x="198662" y="1083310"/>
+                  <a:pt x="116112" y="1333500"/>
+                </a:cubicBezTo>
+                <a:cubicBezTo>
+                  <a:pt x="33562" y="1583690"/>
+                  <a:pt x="-9618" y="1670050"/>
+                  <a:pt x="1812" y="1783080"/>
+                </a:cubicBezTo>
+                <a:cubicBezTo>
+                  <a:pt x="13242" y="1896110"/>
+                  <a:pt x="-55338" y="1976120"/>
+                  <a:pt x="184692" y="2011680"/>
+                </a:cubicBezTo>
+                <a:cubicBezTo>
+                  <a:pt x="424722" y="2047240"/>
+                  <a:pt x="933357" y="2021840"/>
+                  <a:pt x="1441992" y="1996440"/>
+                </a:cubicBezTo>
+              </a:path>
+            </a:pathLst>
+          </a:custGeom>
+          <a:ln>
+            <a:solidFill>
+              <a:srgbClr val="FF0000"/>
+            </a:solidFill>
+            <a:tailEnd type="arrow"/>
+          </a:ln>
+        </p:spPr>
+        <p:style>
+          <a:lnRef idx="1">
+            <a:schemeClr val="accent1"/>
+          </a:lnRef>
+          <a:fillRef idx="0">
+            <a:schemeClr val="accent1"/>
+          </a:fillRef>
+          <a:effectRef idx="0">
+            <a:schemeClr val="accent1"/>
+          </a:effectRef>
+          <a:fontRef idx="minor">
+            <a:schemeClr val="tx1"/>
+          </a:fontRef>
+        </p:style>
+        <p:txBody>
+          <a:bodyPr rtlCol="0" anchor="ctr"/>
+          <a:lstStyle/>
+          <a:p>
+            <a:pPr algn="ctr"/>
+            <a:endParaRPr lang="en-GB">
+              <a:solidFill>
+                <a:schemeClr val="tx1"/>
+              </a:solidFill>
+            </a:endParaRPr>
           </a:p>
         </p:txBody>
       </p:sp>

</xml_diff>